<commit_message>
Update AY 23-24 2nd Sem RM Slides.pptx
</commit_message>
<xml_diff>
--- a/documents/AY 23-24 2nd Sem RM Slides.pptx
+++ b/documents/AY 23-24 2nd Sem RM Slides.pptx
@@ -5,7 +5,7 @@
     <p:sldMasterId id="2147483648" r:id="rId1"/>
   </p:sldMasterIdLst>
   <p:notesMasterIdLst>
-    <p:notesMasterId r:id="rId15"/>
+    <p:notesMasterId r:id="rId20"/>
   </p:notesMasterIdLst>
   <p:sldIdLst>
     <p:sldId id="256" r:id="rId2"/>
@@ -21,6 +21,11 @@
     <p:sldId id="270" r:id="rId12"/>
     <p:sldId id="264" r:id="rId13"/>
     <p:sldId id="274" r:id="rId14"/>
+    <p:sldId id="275" r:id="rId15"/>
+    <p:sldId id="276" r:id="rId16"/>
+    <p:sldId id="277" r:id="rId17"/>
+    <p:sldId id="278" r:id="rId18"/>
+    <p:sldId id="279" r:id="rId19"/>
   </p:sldIdLst>
   <p:sldSz cx="12192000" cy="6858000"/>
   <p:notesSz cx="6858000" cy="9144000"/>
@@ -3161,7 +3166,7 @@
           <a:p>
             <a:fld id="{B2B8B589-3DCF-4CC3-8CB1-8F263020D954}" type="datetimeFigureOut">
               <a:rPr lang="en-PH" smtClean="0"/>
-              <a:t>02/27/2024</a:t>
+              <a:t>03/05/2024</a:t>
             </a:fld>
             <a:endParaRPr lang="en-PH"/>
           </a:p>
@@ -7514,8 +7519,8 @@
               </a:prstGeom>
             </p:spPr>
           </p:pic>
-          <mc:AlternateContent xmlns:mc="http://schemas.openxmlformats.org/markup-compatibility/2006">
-            <mc:Choice xmlns:a14="http://schemas.microsoft.com/office/drawing/2010/main" Requires="a14">
+          <mc:AlternateContent xmlns:mc="http://schemas.openxmlformats.org/markup-compatibility/2006" xmlns:a14="http://schemas.microsoft.com/office/drawing/2010/main">
+            <mc:Choice Requires="a14">
               <p:sp>
                 <p:nvSpPr>
                   <p:cNvPr id="7" name="TextBox 6">
@@ -7564,7 +7569,7 @@
                 </p:txBody>
               </p:sp>
             </mc:Choice>
-            <mc:Fallback>
+            <mc:Fallback xmlns="">
               <p:sp>
                 <p:nvSpPr>
                   <p:cNvPr id="7" name="TextBox 6">
@@ -7666,8 +7671,8 @@
               </a:prstGeom>
             </p:spPr>
           </p:pic>
-          <mc:AlternateContent xmlns:mc="http://schemas.openxmlformats.org/markup-compatibility/2006">
-            <mc:Choice xmlns:a14="http://schemas.microsoft.com/office/drawing/2010/main" Requires="a14">
+          <mc:AlternateContent xmlns:mc="http://schemas.openxmlformats.org/markup-compatibility/2006" xmlns:a14="http://schemas.microsoft.com/office/drawing/2010/main">
+            <mc:Choice Requires="a14">
               <p:sp>
                 <p:nvSpPr>
                   <p:cNvPr id="10" name="TextBox 9">
@@ -7723,7 +7728,7 @@
                 </p:txBody>
               </p:sp>
             </mc:Choice>
-            <mc:Fallback>
+            <mc:Fallback xmlns="">
               <p:sp>
                 <p:nvSpPr>
                   <p:cNvPr id="10" name="TextBox 9">
@@ -8407,6 +8412,926 @@
     <p:extLst>
       <p:ext uri="{BB962C8B-B14F-4D97-AF65-F5344CB8AC3E}">
         <p14:creationId xmlns:p14="http://schemas.microsoft.com/office/powerpoint/2010/main" val="2134293759"/>
+      </p:ext>
+    </p:extLst>
+  </p:cSld>
+  <p:clrMapOvr>
+    <a:masterClrMapping/>
+  </p:clrMapOvr>
+</p:sld>
+</file>
+
+<file path=ppt/slides/slide14.xml><?xml version="1.0" encoding="utf-8"?>
+<p:sld xmlns:a="http://schemas.openxmlformats.org/drawingml/2006/main" xmlns:r="http://schemas.openxmlformats.org/officeDocument/2006/relationships" xmlns:p="http://schemas.openxmlformats.org/presentationml/2006/main">
+  <p:cSld>
+    <p:spTree>
+      <p:nvGrpSpPr>
+        <p:cNvPr id="1" name="">
+          <a:extLst>
+            <a:ext uri="{FF2B5EF4-FFF2-40B4-BE49-F238E27FC236}">
+              <a16:creationId xmlns:a16="http://schemas.microsoft.com/office/drawing/2014/main" id="{9438269A-2D19-2788-21DD-89A53AC3357E}"/>
+            </a:ext>
+          </a:extLst>
+        </p:cNvPr>
+        <p:cNvGrpSpPr/>
+        <p:nvPr/>
+      </p:nvGrpSpPr>
+      <p:grpSpPr>
+        <a:xfrm>
+          <a:off x="0" y="0"/>
+          <a:ext cx="0" cy="0"/>
+          <a:chOff x="0" y="0"/>
+          <a:chExt cx="0" cy="0"/>
+        </a:xfrm>
+      </p:grpSpPr>
+      <p:sp>
+        <p:nvSpPr>
+          <p:cNvPr id="2" name="Title 1">
+            <a:extLst>
+              <a:ext uri="{FF2B5EF4-FFF2-40B4-BE49-F238E27FC236}">
+                <a16:creationId xmlns:a16="http://schemas.microsoft.com/office/drawing/2014/main" id="{FD43B184-4AF3-65F5-271D-6125694FE247}"/>
+              </a:ext>
+            </a:extLst>
+          </p:cNvPr>
+          <p:cNvSpPr>
+            <a:spLocks noGrp="1"/>
+          </p:cNvSpPr>
+          <p:nvPr>
+            <p:ph type="title"/>
+          </p:nvPr>
+        </p:nvSpPr>
+        <p:spPr/>
+        <p:txBody>
+          <a:bodyPr/>
+          <a:lstStyle/>
+          <a:p>
+            <a:r>
+              <a:rPr lang="en-PH" sz="6000" dirty="0"/>
+              <a:t>March 5, 2024</a:t>
+            </a:r>
+            <a:endParaRPr lang="en-PH" dirty="0"/>
+          </a:p>
+        </p:txBody>
+      </p:sp>
+      <p:sp>
+        <p:nvSpPr>
+          <p:cNvPr id="3" name="Slide Number Placeholder 2">
+            <a:extLst>
+              <a:ext uri="{FF2B5EF4-FFF2-40B4-BE49-F238E27FC236}">
+                <a16:creationId xmlns:a16="http://schemas.microsoft.com/office/drawing/2014/main" id="{9CBD280C-C43F-B68E-F981-023849AED15A}"/>
+              </a:ext>
+            </a:extLst>
+          </p:cNvPr>
+          <p:cNvSpPr>
+            <a:spLocks noGrp="1"/>
+          </p:cNvSpPr>
+          <p:nvPr>
+            <p:ph type="sldNum" sz="quarter" idx="12"/>
+          </p:nvPr>
+        </p:nvSpPr>
+        <p:spPr/>
+        <p:txBody>
+          <a:bodyPr/>
+          <a:lstStyle/>
+          <a:p>
+            <a:fld id="{32177519-FDB5-46C8-A273-662D2447F0A4}" type="slidenum">
+              <a:rPr lang="en-PH" smtClean="0"/>
+              <a:t>14</a:t>
+            </a:fld>
+            <a:endParaRPr lang="en-PH"/>
+          </a:p>
+        </p:txBody>
+      </p:sp>
+      <p:sp>
+        <p:nvSpPr>
+          <p:cNvPr id="4" name="Footer Placeholder 3">
+            <a:extLst>
+              <a:ext uri="{FF2B5EF4-FFF2-40B4-BE49-F238E27FC236}">
+                <a16:creationId xmlns:a16="http://schemas.microsoft.com/office/drawing/2014/main" id="{3B5AA3A7-89CA-D844-C59A-E2A6318A2C1F}"/>
+              </a:ext>
+            </a:extLst>
+          </p:cNvPr>
+          <p:cNvSpPr>
+            <a:spLocks noGrp="1"/>
+          </p:cNvSpPr>
+          <p:nvPr>
+            <p:ph type="ftr" sz="quarter" idx="3"/>
+          </p:nvPr>
+        </p:nvSpPr>
+        <p:spPr/>
+        <p:txBody>
+          <a:bodyPr/>
+          <a:lstStyle/>
+          <a:p>
+            <a:endParaRPr lang="en-PH" dirty="0"/>
+          </a:p>
+        </p:txBody>
+      </p:sp>
+      <p:sp>
+        <p:nvSpPr>
+          <p:cNvPr id="5" name="Date Placeholder 4">
+            <a:extLst>
+              <a:ext uri="{FF2B5EF4-FFF2-40B4-BE49-F238E27FC236}">
+                <a16:creationId xmlns:a16="http://schemas.microsoft.com/office/drawing/2014/main" id="{4D9B9D09-82BF-4DFC-E727-9A1A97358975}"/>
+              </a:ext>
+            </a:extLst>
+          </p:cNvPr>
+          <p:cNvSpPr>
+            <a:spLocks noGrp="1"/>
+          </p:cNvSpPr>
+          <p:nvPr>
+            <p:ph type="dt" sz="half" idx="2"/>
+          </p:nvPr>
+        </p:nvSpPr>
+        <p:spPr/>
+        <p:txBody>
+          <a:bodyPr/>
+          <a:lstStyle/>
+          <a:p>
+            <a:r>
+              <a:rPr lang="en-US"/>
+              <a:t>2024.02.27</a:t>
+            </a:r>
+            <a:endParaRPr lang="en-PH" dirty="0"/>
+          </a:p>
+        </p:txBody>
+      </p:sp>
+      <p:sp>
+        <p:nvSpPr>
+          <p:cNvPr id="6" name="Text Placeholder 5">
+            <a:extLst>
+              <a:ext uri="{FF2B5EF4-FFF2-40B4-BE49-F238E27FC236}">
+                <a16:creationId xmlns:a16="http://schemas.microsoft.com/office/drawing/2014/main" id="{5AC83DF5-6B7E-4A60-E2F3-EB53E4B6AE5D}"/>
+              </a:ext>
+            </a:extLst>
+          </p:cNvPr>
+          <p:cNvSpPr>
+            <a:spLocks noGrp="1"/>
+          </p:cNvSpPr>
+          <p:nvPr>
+            <p:ph type="body" sz="quarter" idx="13"/>
+          </p:nvPr>
+        </p:nvSpPr>
+        <p:spPr>
+          <a:xfrm>
+            <a:off x="1103687" y="3166110"/>
+            <a:ext cx="9983414" cy="3080385"/>
+          </a:xfrm>
+        </p:spPr>
+        <p:txBody>
+          <a:bodyPr>
+            <a:normAutofit/>
+          </a:bodyPr>
+          <a:lstStyle/>
+          <a:p>
+            <a:r>
+              <a:rPr lang="en-PH" dirty="0"/>
+              <a:t>Started on standardizing variable names</a:t>
+            </a:r>
+          </a:p>
+        </p:txBody>
+      </p:sp>
+    </p:spTree>
+    <p:extLst>
+      <p:ext uri="{BB962C8B-B14F-4D97-AF65-F5344CB8AC3E}">
+        <p14:creationId xmlns:p14="http://schemas.microsoft.com/office/powerpoint/2010/main" val="1007572754"/>
+      </p:ext>
+    </p:extLst>
+  </p:cSld>
+  <p:clrMapOvr>
+    <a:masterClrMapping/>
+  </p:clrMapOvr>
+</p:sld>
+</file>
+
+<file path=ppt/slides/slide15.xml><?xml version="1.0" encoding="utf-8"?>
+<p:sld xmlns:a="http://schemas.openxmlformats.org/drawingml/2006/main" xmlns:r="http://schemas.openxmlformats.org/officeDocument/2006/relationships" xmlns:p="http://schemas.openxmlformats.org/presentationml/2006/main">
+  <p:cSld>
+    <p:spTree>
+      <p:nvGrpSpPr>
+        <p:cNvPr id="1" name=""/>
+        <p:cNvGrpSpPr/>
+        <p:nvPr/>
+      </p:nvGrpSpPr>
+      <p:grpSpPr>
+        <a:xfrm>
+          <a:off x="0" y="0"/>
+          <a:ext cx="0" cy="0"/>
+          <a:chOff x="0" y="0"/>
+          <a:chExt cx="0" cy="0"/>
+        </a:xfrm>
+      </p:grpSpPr>
+      <p:sp>
+        <p:nvSpPr>
+          <p:cNvPr id="3" name="Slide Number Placeholder 2">
+            <a:extLst>
+              <a:ext uri="{FF2B5EF4-FFF2-40B4-BE49-F238E27FC236}">
+                <a16:creationId xmlns:a16="http://schemas.microsoft.com/office/drawing/2014/main" id="{540FAA32-534C-0B6A-7B62-C7E760612221}"/>
+              </a:ext>
+            </a:extLst>
+          </p:cNvPr>
+          <p:cNvSpPr>
+            <a:spLocks noGrp="1"/>
+          </p:cNvSpPr>
+          <p:nvPr>
+            <p:ph type="sldNum" sz="quarter" idx="12"/>
+          </p:nvPr>
+        </p:nvSpPr>
+        <p:spPr/>
+        <p:txBody>
+          <a:bodyPr/>
+          <a:lstStyle/>
+          <a:p>
+            <a:fld id="{32177519-FDB5-46C8-A273-662D2447F0A4}" type="slidenum">
+              <a:rPr lang="en-PH" smtClean="0"/>
+              <a:t>15</a:t>
+            </a:fld>
+            <a:endParaRPr lang="en-PH"/>
+          </a:p>
+        </p:txBody>
+      </p:sp>
+      <p:sp>
+        <p:nvSpPr>
+          <p:cNvPr id="4" name="Footer Placeholder 3">
+            <a:extLst>
+              <a:ext uri="{FF2B5EF4-FFF2-40B4-BE49-F238E27FC236}">
+                <a16:creationId xmlns:a16="http://schemas.microsoft.com/office/drawing/2014/main" id="{BE9679F1-F855-F452-BB7E-CA9AC0A151A2}"/>
+              </a:ext>
+            </a:extLst>
+          </p:cNvPr>
+          <p:cNvSpPr>
+            <a:spLocks noGrp="1"/>
+          </p:cNvSpPr>
+          <p:nvPr>
+            <p:ph type="ftr" sz="quarter" idx="3"/>
+          </p:nvPr>
+        </p:nvSpPr>
+        <p:spPr/>
+        <p:txBody>
+          <a:bodyPr/>
+          <a:lstStyle/>
+          <a:p>
+            <a:endParaRPr lang="en-PH" dirty="0"/>
+          </a:p>
+        </p:txBody>
+      </p:sp>
+      <p:sp>
+        <p:nvSpPr>
+          <p:cNvPr id="5" name="Date Placeholder 4">
+            <a:extLst>
+              <a:ext uri="{FF2B5EF4-FFF2-40B4-BE49-F238E27FC236}">
+                <a16:creationId xmlns:a16="http://schemas.microsoft.com/office/drawing/2014/main" id="{E34F47D5-E940-5CC0-7107-7038FFA953E0}"/>
+              </a:ext>
+            </a:extLst>
+          </p:cNvPr>
+          <p:cNvSpPr>
+            <a:spLocks noGrp="1"/>
+          </p:cNvSpPr>
+          <p:nvPr>
+            <p:ph type="dt" sz="half" idx="2"/>
+          </p:nvPr>
+        </p:nvSpPr>
+        <p:spPr/>
+        <p:txBody>
+          <a:bodyPr/>
+          <a:lstStyle/>
+          <a:p>
+            <a:r>
+              <a:rPr lang="en-US"/>
+              <a:t>2024.02.27</a:t>
+            </a:r>
+            <a:endParaRPr lang="en-PH" dirty="0"/>
+          </a:p>
+        </p:txBody>
+      </p:sp>
+      <p:pic>
+        <p:nvPicPr>
+          <p:cNvPr id="8" name="Picture 7">
+            <a:extLst>
+              <a:ext uri="{FF2B5EF4-FFF2-40B4-BE49-F238E27FC236}">
+                <a16:creationId xmlns:a16="http://schemas.microsoft.com/office/drawing/2014/main" id="{35D872BA-D4FC-D70F-6722-45679C5C13EA}"/>
+              </a:ext>
+            </a:extLst>
+          </p:cNvPr>
+          <p:cNvPicPr>
+            <a:picLocks noChangeAspect="1"/>
+          </p:cNvPicPr>
+          <p:nvPr/>
+        </p:nvPicPr>
+        <p:blipFill>
+          <a:blip r:embed="rId2"/>
+          <a:stretch>
+            <a:fillRect/>
+          </a:stretch>
+        </p:blipFill>
+        <p:spPr>
+          <a:xfrm>
+            <a:off x="0" y="776192"/>
+            <a:ext cx="12192000" cy="5305615"/>
+          </a:xfrm>
+          <a:prstGeom prst="rect">
+            <a:avLst/>
+          </a:prstGeom>
+        </p:spPr>
+      </p:pic>
+    </p:spTree>
+    <p:extLst>
+      <p:ext uri="{BB962C8B-B14F-4D97-AF65-F5344CB8AC3E}">
+        <p14:creationId xmlns:p14="http://schemas.microsoft.com/office/powerpoint/2010/main" val="974657956"/>
+      </p:ext>
+    </p:extLst>
+  </p:cSld>
+  <p:clrMapOvr>
+    <a:masterClrMapping/>
+  </p:clrMapOvr>
+</p:sld>
+</file>
+
+<file path=ppt/slides/slide16.xml><?xml version="1.0" encoding="utf-8"?>
+<p:sld xmlns:a="http://schemas.openxmlformats.org/drawingml/2006/main" xmlns:r="http://schemas.openxmlformats.org/officeDocument/2006/relationships" xmlns:p="http://schemas.openxmlformats.org/presentationml/2006/main">
+  <p:cSld>
+    <p:spTree>
+      <p:nvGrpSpPr>
+        <p:cNvPr id="1" name=""/>
+        <p:cNvGrpSpPr/>
+        <p:nvPr/>
+      </p:nvGrpSpPr>
+      <p:grpSpPr>
+        <a:xfrm>
+          <a:off x="0" y="0"/>
+          <a:ext cx="0" cy="0"/>
+          <a:chOff x="0" y="0"/>
+          <a:chExt cx="0" cy="0"/>
+        </a:xfrm>
+      </p:grpSpPr>
+      <p:sp>
+        <p:nvSpPr>
+          <p:cNvPr id="2" name="Slide Number Placeholder 1">
+            <a:extLst>
+              <a:ext uri="{FF2B5EF4-FFF2-40B4-BE49-F238E27FC236}">
+                <a16:creationId xmlns:a16="http://schemas.microsoft.com/office/drawing/2014/main" id="{8A8B3133-E59C-27BE-700C-0ECD3D4C9072}"/>
+              </a:ext>
+            </a:extLst>
+          </p:cNvPr>
+          <p:cNvSpPr>
+            <a:spLocks noGrp="1"/>
+          </p:cNvSpPr>
+          <p:nvPr>
+            <p:ph type="sldNum" sz="quarter" idx="12"/>
+          </p:nvPr>
+        </p:nvSpPr>
+        <p:spPr/>
+        <p:txBody>
+          <a:bodyPr/>
+          <a:lstStyle/>
+          <a:p>
+            <a:fld id="{32177519-FDB5-46C8-A273-662D2447F0A4}" type="slidenum">
+              <a:rPr lang="en-PH" smtClean="0"/>
+              <a:t>16</a:t>
+            </a:fld>
+            <a:endParaRPr lang="en-PH"/>
+          </a:p>
+        </p:txBody>
+      </p:sp>
+      <p:sp>
+        <p:nvSpPr>
+          <p:cNvPr id="3" name="Footer Placeholder 2">
+            <a:extLst>
+              <a:ext uri="{FF2B5EF4-FFF2-40B4-BE49-F238E27FC236}">
+                <a16:creationId xmlns:a16="http://schemas.microsoft.com/office/drawing/2014/main" id="{E57CE54D-1E79-C6D9-E499-A83C233F0FA1}"/>
+              </a:ext>
+            </a:extLst>
+          </p:cNvPr>
+          <p:cNvSpPr>
+            <a:spLocks noGrp="1"/>
+          </p:cNvSpPr>
+          <p:nvPr>
+            <p:ph type="ftr" sz="quarter" idx="3"/>
+          </p:nvPr>
+        </p:nvSpPr>
+        <p:spPr/>
+        <p:txBody>
+          <a:bodyPr/>
+          <a:lstStyle/>
+          <a:p>
+            <a:endParaRPr lang="en-PH" dirty="0"/>
+          </a:p>
+        </p:txBody>
+      </p:sp>
+      <p:sp>
+        <p:nvSpPr>
+          <p:cNvPr id="4" name="Date Placeholder 3">
+            <a:extLst>
+              <a:ext uri="{FF2B5EF4-FFF2-40B4-BE49-F238E27FC236}">
+                <a16:creationId xmlns:a16="http://schemas.microsoft.com/office/drawing/2014/main" id="{7ABA2A21-ABE5-A49F-8259-9B56DB82C0AC}"/>
+              </a:ext>
+            </a:extLst>
+          </p:cNvPr>
+          <p:cNvSpPr>
+            <a:spLocks noGrp="1"/>
+          </p:cNvSpPr>
+          <p:nvPr>
+            <p:ph type="dt" sz="half" idx="2"/>
+          </p:nvPr>
+        </p:nvSpPr>
+        <p:spPr/>
+        <p:txBody>
+          <a:bodyPr/>
+          <a:lstStyle/>
+          <a:p>
+            <a:r>
+              <a:rPr lang="en-US"/>
+              <a:t>2024.02.27</a:t>
+            </a:r>
+            <a:endParaRPr lang="en-PH" dirty="0"/>
+          </a:p>
+        </p:txBody>
+      </p:sp>
+      <p:pic>
+        <p:nvPicPr>
+          <p:cNvPr id="6" name="Picture 5">
+            <a:extLst>
+              <a:ext uri="{FF2B5EF4-FFF2-40B4-BE49-F238E27FC236}">
+                <a16:creationId xmlns:a16="http://schemas.microsoft.com/office/drawing/2014/main" id="{2C81EA30-3D8E-7243-C549-A4C850FAC0C9}"/>
+              </a:ext>
+            </a:extLst>
+          </p:cNvPr>
+          <p:cNvPicPr>
+            <a:picLocks noChangeAspect="1"/>
+          </p:cNvPicPr>
+          <p:nvPr/>
+        </p:nvPicPr>
+        <p:blipFill>
+          <a:blip r:embed="rId2"/>
+          <a:stretch>
+            <a:fillRect/>
+          </a:stretch>
+        </p:blipFill>
+        <p:spPr>
+          <a:xfrm>
+            <a:off x="0" y="1893152"/>
+            <a:ext cx="12192000" cy="3071696"/>
+          </a:xfrm>
+          <a:prstGeom prst="rect">
+            <a:avLst/>
+          </a:prstGeom>
+        </p:spPr>
+      </p:pic>
+    </p:spTree>
+    <p:extLst>
+      <p:ext uri="{BB962C8B-B14F-4D97-AF65-F5344CB8AC3E}">
+        <p14:creationId xmlns:p14="http://schemas.microsoft.com/office/powerpoint/2010/main" val="968879284"/>
+      </p:ext>
+    </p:extLst>
+  </p:cSld>
+  <p:clrMapOvr>
+    <a:masterClrMapping/>
+  </p:clrMapOvr>
+</p:sld>
+</file>
+
+<file path=ppt/slides/slide17.xml><?xml version="1.0" encoding="utf-8"?>
+<p:sld xmlns:a="http://schemas.openxmlformats.org/drawingml/2006/main" xmlns:r="http://schemas.openxmlformats.org/officeDocument/2006/relationships" xmlns:p="http://schemas.openxmlformats.org/presentationml/2006/main">
+  <p:cSld>
+    <p:spTree>
+      <p:nvGrpSpPr>
+        <p:cNvPr id="1" name="">
+          <a:extLst>
+            <a:ext uri="{FF2B5EF4-FFF2-40B4-BE49-F238E27FC236}">
+              <a16:creationId xmlns:a16="http://schemas.microsoft.com/office/drawing/2014/main" id="{E3F5C5D3-0E50-7394-2435-B4EED110D826}"/>
+            </a:ext>
+          </a:extLst>
+        </p:cNvPr>
+        <p:cNvGrpSpPr/>
+        <p:nvPr/>
+      </p:nvGrpSpPr>
+      <p:grpSpPr>
+        <a:xfrm>
+          <a:off x="0" y="0"/>
+          <a:ext cx="0" cy="0"/>
+          <a:chOff x="0" y="0"/>
+          <a:chExt cx="0" cy="0"/>
+        </a:xfrm>
+      </p:grpSpPr>
+      <p:sp>
+        <p:nvSpPr>
+          <p:cNvPr id="2" name="Title 1">
+            <a:extLst>
+              <a:ext uri="{FF2B5EF4-FFF2-40B4-BE49-F238E27FC236}">
+                <a16:creationId xmlns:a16="http://schemas.microsoft.com/office/drawing/2014/main" id="{83AFA31A-A9D4-88FF-ABEB-178B5DA9EB2E}"/>
+              </a:ext>
+            </a:extLst>
+          </p:cNvPr>
+          <p:cNvSpPr>
+            <a:spLocks noGrp="1"/>
+          </p:cNvSpPr>
+          <p:nvPr>
+            <p:ph type="title"/>
+          </p:nvPr>
+        </p:nvSpPr>
+        <p:spPr/>
+        <p:txBody>
+          <a:bodyPr/>
+          <a:lstStyle/>
+          <a:p>
+            <a:r>
+              <a:rPr lang="en-PH" dirty="0"/>
+              <a:t>To do: (analysis)</a:t>
+            </a:r>
+          </a:p>
+        </p:txBody>
+      </p:sp>
+      <p:sp>
+        <p:nvSpPr>
+          <p:cNvPr id="3" name="Content Placeholder 2">
+            <a:extLst>
+              <a:ext uri="{FF2B5EF4-FFF2-40B4-BE49-F238E27FC236}">
+                <a16:creationId xmlns:a16="http://schemas.microsoft.com/office/drawing/2014/main" id="{B829A88B-AA55-88A8-D3C5-B4929E274CD1}"/>
+              </a:ext>
+            </a:extLst>
+          </p:cNvPr>
+          <p:cNvSpPr>
+            <a:spLocks noGrp="1"/>
+          </p:cNvSpPr>
+          <p:nvPr>
+            <p:ph idx="1"/>
+          </p:nvPr>
+        </p:nvSpPr>
+        <p:spPr>
+          <a:xfrm>
+            <a:off x="283265" y="1733384"/>
+            <a:ext cx="11625470" cy="4621696"/>
+          </a:xfrm>
+        </p:spPr>
+        <p:txBody>
+          <a:bodyPr>
+            <a:normAutofit/>
+          </a:bodyPr>
+          <a:lstStyle/>
+          <a:p>
+            <a:pPr lvl="1">
+              <a:lnSpc>
+                <a:spcPct val="150000"/>
+              </a:lnSpc>
+            </a:pPr>
+            <a:r>
+              <a:rPr lang="en-PH" b="1" dirty="0"/>
+              <a:t>Normalize TTL vs Class size graph</a:t>
+            </a:r>
+          </a:p>
+          <a:p>
+            <a:pPr lvl="1">
+              <a:lnSpc>
+                <a:spcPct val="150000"/>
+              </a:lnSpc>
+            </a:pPr>
+            <a:r>
+              <a:rPr lang="en-PH" b="1" dirty="0"/>
+              <a:t>Compare current data with theoretical TTL (see relevant plot slides for comments)</a:t>
+            </a:r>
+          </a:p>
+          <a:p>
+            <a:pPr lvl="1">
+              <a:lnSpc>
+                <a:spcPct val="150000"/>
+              </a:lnSpc>
+            </a:pPr>
+            <a:r>
+              <a:rPr lang="en-PH" b="1" dirty="0"/>
+              <a:t>Normalize TTL vs lambda graphs</a:t>
+            </a:r>
+          </a:p>
+        </p:txBody>
+      </p:sp>
+      <p:sp>
+        <p:nvSpPr>
+          <p:cNvPr id="4" name="Slide Number Placeholder 3">
+            <a:extLst>
+              <a:ext uri="{FF2B5EF4-FFF2-40B4-BE49-F238E27FC236}">
+                <a16:creationId xmlns:a16="http://schemas.microsoft.com/office/drawing/2014/main" id="{964DC7A2-8194-D871-7BCC-E4E6C1389680}"/>
+              </a:ext>
+            </a:extLst>
+          </p:cNvPr>
+          <p:cNvSpPr>
+            <a:spLocks noGrp="1"/>
+          </p:cNvSpPr>
+          <p:nvPr>
+            <p:ph type="sldNum" sz="quarter" idx="12"/>
+          </p:nvPr>
+        </p:nvSpPr>
+        <p:spPr/>
+        <p:txBody>
+          <a:bodyPr/>
+          <a:lstStyle/>
+          <a:p>
+            <a:fld id="{367A0FFC-85A0-44D4-AF3C-BA7A79D4CEC3}" type="slidenum">
+              <a:rPr lang="en-PH" smtClean="0"/>
+              <a:t>17</a:t>
+            </a:fld>
+            <a:endParaRPr lang="en-PH"/>
+          </a:p>
+        </p:txBody>
+      </p:sp>
+      <p:sp>
+        <p:nvSpPr>
+          <p:cNvPr id="5" name="Date Placeholder 4">
+            <a:extLst>
+              <a:ext uri="{FF2B5EF4-FFF2-40B4-BE49-F238E27FC236}">
+                <a16:creationId xmlns:a16="http://schemas.microsoft.com/office/drawing/2014/main" id="{7DCD3FB9-875E-C03E-372F-1D22C62AD537}"/>
+              </a:ext>
+            </a:extLst>
+          </p:cNvPr>
+          <p:cNvSpPr>
+            <a:spLocks noGrp="1"/>
+          </p:cNvSpPr>
+          <p:nvPr>
+            <p:ph type="dt" sz="half" idx="2"/>
+          </p:nvPr>
+        </p:nvSpPr>
+        <p:spPr/>
+        <p:txBody>
+          <a:bodyPr/>
+          <a:lstStyle/>
+          <a:p>
+            <a:r>
+              <a:rPr lang="en-US"/>
+              <a:t>2024.02.27</a:t>
+            </a:r>
+            <a:endParaRPr lang="en-PH" dirty="0"/>
+          </a:p>
+        </p:txBody>
+      </p:sp>
+      <p:sp>
+        <p:nvSpPr>
+          <p:cNvPr id="6" name="Footer Placeholder 5">
+            <a:extLst>
+              <a:ext uri="{FF2B5EF4-FFF2-40B4-BE49-F238E27FC236}">
+                <a16:creationId xmlns:a16="http://schemas.microsoft.com/office/drawing/2014/main" id="{074E2C46-DABA-0522-A9E7-CAAB73D9796B}"/>
+              </a:ext>
+            </a:extLst>
+          </p:cNvPr>
+          <p:cNvSpPr>
+            <a:spLocks noGrp="1"/>
+          </p:cNvSpPr>
+          <p:nvPr>
+            <p:ph type="ftr" sz="quarter" idx="3"/>
+          </p:nvPr>
+        </p:nvSpPr>
+        <p:spPr/>
+        <p:txBody>
+          <a:bodyPr/>
+          <a:lstStyle/>
+          <a:p>
+            <a:endParaRPr lang="en-PH" dirty="0"/>
+          </a:p>
+        </p:txBody>
+      </p:sp>
+    </p:spTree>
+    <p:extLst>
+      <p:ext uri="{BB962C8B-B14F-4D97-AF65-F5344CB8AC3E}">
+        <p14:creationId xmlns:p14="http://schemas.microsoft.com/office/powerpoint/2010/main" val="2034348417"/>
+      </p:ext>
+    </p:extLst>
+  </p:cSld>
+  <p:clrMapOvr>
+    <a:masterClrMapping/>
+  </p:clrMapOvr>
+</p:sld>
+</file>
+
+<file path=ppt/slides/slide18.xml><?xml version="1.0" encoding="utf-8"?>
+<p:sld xmlns:a="http://schemas.openxmlformats.org/drawingml/2006/main" xmlns:r="http://schemas.openxmlformats.org/officeDocument/2006/relationships" xmlns:p="http://schemas.openxmlformats.org/presentationml/2006/main">
+  <p:cSld>
+    <p:spTree>
+      <p:nvGrpSpPr>
+        <p:cNvPr id="1" name="">
+          <a:extLst>
+            <a:ext uri="{FF2B5EF4-FFF2-40B4-BE49-F238E27FC236}">
+              <a16:creationId xmlns:a16="http://schemas.microsoft.com/office/drawing/2014/main" id="{21520262-1EBD-89F2-2EE3-FAA438D0713D}"/>
+            </a:ext>
+          </a:extLst>
+        </p:cNvPr>
+        <p:cNvGrpSpPr/>
+        <p:nvPr/>
+      </p:nvGrpSpPr>
+      <p:grpSpPr>
+        <a:xfrm>
+          <a:off x="0" y="0"/>
+          <a:ext cx="0" cy="0"/>
+          <a:chOff x="0" y="0"/>
+          <a:chExt cx="0" cy="0"/>
+        </a:xfrm>
+      </p:grpSpPr>
+      <p:sp>
+        <p:nvSpPr>
+          <p:cNvPr id="2" name="Title 1">
+            <a:extLst>
+              <a:ext uri="{FF2B5EF4-FFF2-40B4-BE49-F238E27FC236}">
+                <a16:creationId xmlns:a16="http://schemas.microsoft.com/office/drawing/2014/main" id="{99A7BDE7-1BE9-7FF7-46BE-4CB515D180B6}"/>
+              </a:ext>
+            </a:extLst>
+          </p:cNvPr>
+          <p:cNvSpPr>
+            <a:spLocks noGrp="1"/>
+          </p:cNvSpPr>
+          <p:nvPr>
+            <p:ph type="title"/>
+          </p:nvPr>
+        </p:nvSpPr>
+        <p:spPr/>
+        <p:txBody>
+          <a:bodyPr/>
+          <a:lstStyle/>
+          <a:p>
+            <a:r>
+              <a:rPr lang="en-PH" dirty="0"/>
+              <a:t>To do: (more model interactions)</a:t>
+            </a:r>
+          </a:p>
+        </p:txBody>
+      </p:sp>
+      <p:sp>
+        <p:nvSpPr>
+          <p:cNvPr id="3" name="Content Placeholder 2">
+            <a:extLst>
+              <a:ext uri="{FF2B5EF4-FFF2-40B4-BE49-F238E27FC236}">
+                <a16:creationId xmlns:a16="http://schemas.microsoft.com/office/drawing/2014/main" id="{529EE04A-0C09-2E62-1B0C-7468FCCEDC2D}"/>
+              </a:ext>
+            </a:extLst>
+          </p:cNvPr>
+          <p:cNvSpPr>
+            <a:spLocks noGrp="1"/>
+          </p:cNvSpPr>
+          <p:nvPr>
+            <p:ph idx="1"/>
+          </p:nvPr>
+        </p:nvSpPr>
+        <p:spPr>
+          <a:xfrm>
+            <a:off x="283265" y="1733384"/>
+            <a:ext cx="11625470" cy="4621696"/>
+          </a:xfrm>
+        </p:spPr>
+        <p:txBody>
+          <a:bodyPr>
+            <a:normAutofit lnSpcReduction="10000"/>
+          </a:bodyPr>
+          <a:lstStyle/>
+          <a:p>
+            <a:pPr lvl="1">
+              <a:lnSpc>
+                <a:spcPct val="150000"/>
+              </a:lnSpc>
+            </a:pPr>
+            <a:r>
+              <a:rPr lang="en-PH" dirty="0"/>
+              <a:t>Introduce orientation bias in the system (anisotropic system)</a:t>
+            </a:r>
+          </a:p>
+          <a:p>
+            <a:pPr lvl="1">
+              <a:lnSpc>
+                <a:spcPct val="150000"/>
+              </a:lnSpc>
+            </a:pPr>
+            <a:r>
+              <a:rPr lang="en-PH" dirty="0"/>
+              <a:t>Introduce inhomogeneous individual learning rate</a:t>
+            </a:r>
+          </a:p>
+          <a:p>
+            <a:pPr lvl="1">
+              <a:lnSpc>
+                <a:spcPct val="150000"/>
+              </a:lnSpc>
+            </a:pPr>
+            <a:r>
+              <a:rPr lang="en-PH" dirty="0"/>
+              <a:t>Model the benefit of local/neighborhood homogeneity</a:t>
+            </a:r>
+          </a:p>
+          <a:p>
+            <a:pPr lvl="1">
+              <a:lnSpc>
+                <a:spcPct val="150000"/>
+              </a:lnSpc>
+            </a:pPr>
+            <a:r>
+              <a:rPr lang="en-PH" dirty="0"/>
+              <a:t>Introduce memory or unlearning to the system</a:t>
+            </a:r>
+          </a:p>
+          <a:p>
+            <a:pPr lvl="1">
+              <a:lnSpc>
+                <a:spcPct val="150000"/>
+              </a:lnSpc>
+            </a:pPr>
+            <a:r>
+              <a:rPr lang="en-PH" dirty="0"/>
+              <a:t>Adjust model to accommodate continuous student states</a:t>
+            </a:r>
+          </a:p>
+          <a:p>
+            <a:pPr lvl="1">
+              <a:lnSpc>
+                <a:spcPct val="150000"/>
+              </a:lnSpc>
+            </a:pPr>
+            <a:r>
+              <a:rPr lang="en-PH" dirty="0"/>
+              <a:t>Fit model parameters to existing data</a:t>
+            </a:r>
+          </a:p>
+        </p:txBody>
+      </p:sp>
+      <p:sp>
+        <p:nvSpPr>
+          <p:cNvPr id="4" name="Slide Number Placeholder 3">
+            <a:extLst>
+              <a:ext uri="{FF2B5EF4-FFF2-40B4-BE49-F238E27FC236}">
+                <a16:creationId xmlns:a16="http://schemas.microsoft.com/office/drawing/2014/main" id="{8A05AF3E-02E8-3F0A-0C4B-B6EB030E7820}"/>
+              </a:ext>
+            </a:extLst>
+          </p:cNvPr>
+          <p:cNvSpPr>
+            <a:spLocks noGrp="1"/>
+          </p:cNvSpPr>
+          <p:nvPr>
+            <p:ph type="sldNum" sz="quarter" idx="12"/>
+          </p:nvPr>
+        </p:nvSpPr>
+        <p:spPr/>
+        <p:txBody>
+          <a:bodyPr/>
+          <a:lstStyle/>
+          <a:p>
+            <a:fld id="{367A0FFC-85A0-44D4-AF3C-BA7A79D4CEC3}" type="slidenum">
+              <a:rPr lang="en-PH" smtClean="0"/>
+              <a:t>18</a:t>
+            </a:fld>
+            <a:endParaRPr lang="en-PH"/>
+          </a:p>
+        </p:txBody>
+      </p:sp>
+      <p:sp>
+        <p:nvSpPr>
+          <p:cNvPr id="5" name="Date Placeholder 4">
+            <a:extLst>
+              <a:ext uri="{FF2B5EF4-FFF2-40B4-BE49-F238E27FC236}">
+                <a16:creationId xmlns:a16="http://schemas.microsoft.com/office/drawing/2014/main" id="{95301F4C-2F0C-301E-C9B9-9C309E8C585D}"/>
+              </a:ext>
+            </a:extLst>
+          </p:cNvPr>
+          <p:cNvSpPr>
+            <a:spLocks noGrp="1"/>
+          </p:cNvSpPr>
+          <p:nvPr>
+            <p:ph type="dt" sz="half" idx="2"/>
+          </p:nvPr>
+        </p:nvSpPr>
+        <p:spPr/>
+        <p:txBody>
+          <a:bodyPr/>
+          <a:lstStyle/>
+          <a:p>
+            <a:r>
+              <a:rPr lang="en-US"/>
+              <a:t>2024.02.27</a:t>
+            </a:r>
+            <a:endParaRPr lang="en-PH" dirty="0"/>
+          </a:p>
+        </p:txBody>
+      </p:sp>
+      <p:sp>
+        <p:nvSpPr>
+          <p:cNvPr id="6" name="Footer Placeholder 5">
+            <a:extLst>
+              <a:ext uri="{FF2B5EF4-FFF2-40B4-BE49-F238E27FC236}">
+                <a16:creationId xmlns:a16="http://schemas.microsoft.com/office/drawing/2014/main" id="{5BF86AF5-58D1-D1CA-CEC7-97AF66D10E00}"/>
+              </a:ext>
+            </a:extLst>
+          </p:cNvPr>
+          <p:cNvSpPr>
+            <a:spLocks noGrp="1"/>
+          </p:cNvSpPr>
+          <p:nvPr>
+            <p:ph type="ftr" sz="quarter" idx="3"/>
+          </p:nvPr>
+        </p:nvSpPr>
+        <p:spPr/>
+        <p:txBody>
+          <a:bodyPr/>
+          <a:lstStyle/>
+          <a:p>
+            <a:endParaRPr lang="en-PH" dirty="0"/>
+          </a:p>
+        </p:txBody>
+      </p:sp>
+    </p:spTree>
+    <p:extLst>
+      <p:ext uri="{BB962C8B-B14F-4D97-AF65-F5344CB8AC3E}">
+        <p14:creationId xmlns:p14="http://schemas.microsoft.com/office/powerpoint/2010/main" val="2956867630"/>
       </p:ext>
     </p:extLst>
   </p:cSld>
@@ -10955,8 +11880,8 @@
           </a:graphicData>
         </a:graphic>
       </p:graphicFrame>
-      <mc:AlternateContent xmlns:mc="http://schemas.openxmlformats.org/markup-compatibility/2006">
-        <mc:Choice xmlns:a14="http://schemas.microsoft.com/office/drawing/2010/main" Requires="a14">
+      <mc:AlternateContent xmlns:mc="http://schemas.openxmlformats.org/markup-compatibility/2006" xmlns:a14="http://schemas.microsoft.com/office/drawing/2010/main">
+        <mc:Choice Requires="a14">
           <p:graphicFrame>
             <p:nvGraphicFramePr>
               <p:cNvPr id="9" name="Table 5">
@@ -11594,7 +12519,7 @@
             </a:graphic>
           </p:graphicFrame>
         </mc:Choice>
-        <mc:Fallback>
+        <mc:Fallback xmlns="">
           <p:graphicFrame>
             <p:nvGraphicFramePr>
               <p:cNvPr id="9" name="Table 5">
@@ -11947,8 +12872,8 @@
           </a:p>
         </p:txBody>
       </p:sp>
-      <mc:AlternateContent xmlns:mc="http://schemas.openxmlformats.org/markup-compatibility/2006">
-        <mc:Choice xmlns:a14="http://schemas.microsoft.com/office/drawing/2010/main" Requires="a14">
+      <mc:AlternateContent xmlns:mc="http://schemas.openxmlformats.org/markup-compatibility/2006" xmlns:a14="http://schemas.microsoft.com/office/drawing/2010/main">
+        <mc:Choice Requires="a14">
           <p:sp>
             <p:nvSpPr>
               <p:cNvPr id="13" name="TextBox 12">
@@ -12115,7 +13040,7 @@
             </p:txBody>
           </p:sp>
         </mc:Choice>
-        <mc:Fallback>
+        <mc:Fallback xmlns="">
           <p:sp>
             <p:nvSpPr>
               <p:cNvPr id="13" name="TextBox 12">

</xml_diff>